<commit_message>
some (performacnce) tweaks and testing rework
</commit_message>
<xml_diff>
--- a/docs/Rijksmuseum_data.pptx
+++ b/docs/Rijksmuseum_data.pptx
@@ -15985,7 +15985,7 @@
         <p:spPr>
           <a:xfrm>
             <a:off x="838200" y="1690688"/>
-            <a:ext cx="7401665" cy="923330"/>
+            <a:ext cx="7401665" cy="1200329"/>
           </a:xfrm>
           <a:prstGeom prst="rect">
             <a:avLst/>
@@ -15998,6 +15998,10 @@
           </a:bodyPr>
           <a:lstStyle/>
           <a:p>
+            <a:pPr marL="285750" indent="-285750">
+              <a:buFont typeface="Arial" panose="020B0604020202020204" pitchFamily="34" charset="0"/>
+              <a:buChar char="•"/>
+            </a:pPr>
             <a:r>
               <a:rPr lang="nl-NL" dirty="0"/>
               <a:t>Store </a:t>
@@ -16041,6 +16045,10 @@
             <a:endParaRPr lang="nl-NL" dirty="0"/>
           </a:p>
           <a:p>
+            <a:pPr marL="285750" indent="-285750">
+              <a:buFont typeface="Arial" panose="020B0604020202020204" pitchFamily="34" charset="0"/>
+              <a:buChar char="•"/>
+            </a:pPr>
             <a:r>
               <a:rPr lang="nl-NL" dirty="0" err="1"/>
               <a:t>Only</a:t>
@@ -16051,6 +16059,10 @@
             </a:r>
           </a:p>
           <a:p>
+            <a:pPr marL="285750" indent="-285750">
+              <a:buFont typeface="Arial" panose="020B0604020202020204" pitchFamily="34" charset="0"/>
+              <a:buChar char="•"/>
+            </a:pPr>
             <a:r>
               <a:rPr lang="nl-NL" dirty="0"/>
               <a:t>XML </a:t>
@@ -16088,8 +16100,52 @@
               <a:t> strings</a:t>
             </a:r>
           </a:p>
-        </p:txBody>
-      </p:sp>
+          <a:p>
+            <a:pPr marL="285750" indent="-285750">
+              <a:buFont typeface="Arial" panose="020B0604020202020204" pitchFamily="34" charset="0"/>
+              <a:buChar char="•"/>
+            </a:pPr>
+            <a:r>
+              <a:rPr lang="nl-NL" dirty="0" err="1"/>
+              <a:t>Retry</a:t>
+            </a:r>
+            <a:r>
+              <a:rPr lang="nl-NL" dirty="0"/>
+              <a:t> on failure</a:t>
+            </a:r>
+          </a:p>
+        </p:txBody>
+      </p:sp>
+      <p:pic>
+        <p:nvPicPr>
+          <p:cNvPr id="4" name="Afbeelding 3">
+            <a:extLst>
+              <a:ext uri="{FF2B5EF4-FFF2-40B4-BE49-F238E27FC236}">
+                <a16:creationId xmlns:a16="http://schemas.microsoft.com/office/drawing/2014/main" id="{9512FC46-71FC-F84D-0B0E-E1AFE15A5FF0}"/>
+              </a:ext>
+            </a:extLst>
+          </p:cNvPr>
+          <p:cNvPicPr>
+            <a:picLocks noChangeAspect="1"/>
+          </p:cNvPicPr>
+          <p:nvPr/>
+        </p:nvPicPr>
+        <p:blipFill>
+          <a:blip r:embed="rId2"/>
+          <a:stretch>
+            <a:fillRect/>
+          </a:stretch>
+        </p:blipFill>
+        <p:spPr>
+          <a:xfrm>
+            <a:off x="838200" y="3524927"/>
+            <a:ext cx="7240010" cy="1295581"/>
+          </a:xfrm>
+          <a:prstGeom prst="rect">
+            <a:avLst/>
+          </a:prstGeom>
+        </p:spPr>
+      </p:pic>
     </p:spTree>
     <p:extLst>
       <p:ext uri="{BB962C8B-B14F-4D97-AF65-F5344CB8AC3E}">

</xml_diff>